<commit_message>
Updates to chart styles and templates
</commit_message>
<xml_diff>
--- a/templates/DATAIMPORT.pptx
+++ b/templates/DATAIMPORT.pptx
@@ -23709,6 +23709,68 @@
       </p:grpSpPr>
       <p:sp>
         <p:nvSpPr>
+          <p:cNvPr id="11" name="Footer Placeholder 3">
+            <a:extLst>
+              <a:ext uri="{FF2B5EF4-FFF2-40B4-BE49-F238E27FC236}">
+                <a16:creationId xmlns:a16="http://schemas.microsoft.com/office/drawing/2014/main" id="{DAE038C8-495A-46D3-AE0C-462D123EB0CC}"/>
+              </a:ext>
+            </a:extLst>
+          </p:cNvPr>
+          <p:cNvSpPr>
+            <a:spLocks noGrp="1"/>
+          </p:cNvSpPr>
+          <p:nvPr>
+            <p:ph type="ftr" sz="quarter" idx="3"/>
+          </p:nvPr>
+        </p:nvSpPr>
+        <p:spPr>
+          <a:xfrm>
+            <a:off x="457199" y="6023777"/>
+            <a:ext cx="11268547" cy="365125"/>
+          </a:xfrm>
+          <a:prstGeom prst="rect">
+            <a:avLst/>
+          </a:prstGeom>
+        </p:spPr>
+        <p:txBody>
+          <a:bodyPr vert="horz" lIns="0" tIns="0" rIns="0" bIns="0" rtlCol="0" anchor="b"/>
+          <a:lstStyle>
+            <a:lvl1pPr algn="l">
+              <a:spcBef>
+                <a:spcPts val="0"/>
+              </a:spcBef>
+              <a:defRPr sz="800">
+                <a:solidFill>
+                  <a:schemeClr val="tx1"/>
+                </a:solidFill>
+              </a:defRPr>
+            </a:lvl1pPr>
+          </a:lstStyle>
+          <a:p>
+            <a:r>
+              <a:rPr lang="en-US"/>
+              <a:t>Base:</a:t>
+            </a:r>
+            <a:br>
+              <a:rPr lang="en-US"/>
+            </a:br>
+            <a:r>
+              <a:rPr lang="en-US"/>
+              <a:t>Q:</a:t>
+            </a:r>
+            <a:br>
+              <a:rPr lang="en-US"/>
+            </a:br>
+            <a:r>
+              <a:rPr lang="en-US"/>
+              <a:t>Note:</a:t>
+            </a:r>
+            <a:endParaRPr lang="en-US" dirty="0"/>
+          </a:p>
+        </p:txBody>
+      </p:sp>
+      <p:sp>
+        <p:nvSpPr>
           <p:cNvPr id="6" name="PPH-SlideNo"/>
           <p:cNvSpPr>
             <a:spLocks noGrp="1"/>
@@ -23756,18 +23818,24 @@
       </p:sp>
       <p:sp>
         <p:nvSpPr>
-          <p:cNvPr id="7" name="Chart 1"/>
+          <p:cNvPr id="17" name="Chart 6">
+            <a:extLst>
+              <a:ext uri="{FF2B5EF4-FFF2-40B4-BE49-F238E27FC236}">
+                <a16:creationId xmlns:a16="http://schemas.microsoft.com/office/drawing/2014/main" id="{5C90DE2B-2F52-47A7-B950-947885ED2074}"/>
+              </a:ext>
+            </a:extLst>
+          </p:cNvPr>
           <p:cNvSpPr>
             <a:spLocks noGrp="1"/>
           </p:cNvSpPr>
           <p:nvPr>
-            <p:ph type="chart" sz="quarter" idx="14"/>
+            <p:ph type="chart" sz="quarter" idx="25"/>
           </p:nvPr>
         </p:nvSpPr>
         <p:spPr>
           <a:xfrm>
-            <a:off x="468990" y="419100"/>
-            <a:ext cx="3456432" cy="2508095"/>
+            <a:off x="457200" y="436549"/>
+            <a:ext cx="3456432" cy="2624328"/>
           </a:xfrm>
           <a:prstGeom prst="rect">
             <a:avLst/>
@@ -23783,10 +23851,10 @@
       </p:sp>
       <p:sp>
         <p:nvSpPr>
-          <p:cNvPr id="8" name="Footer Placeholder 3">
+          <p:cNvPr id="16" name="Chart 5">
             <a:extLst>
               <a:ext uri="{FF2B5EF4-FFF2-40B4-BE49-F238E27FC236}">
-                <a16:creationId xmlns:a16="http://schemas.microsoft.com/office/drawing/2014/main" id="{DD6FD9F6-1743-43A6-9B04-3708C9942325}"/>
+                <a16:creationId xmlns:a16="http://schemas.microsoft.com/office/drawing/2014/main" id="{8DA1412E-5833-4015-AAA2-0C72380BBCFE}"/>
               </a:ext>
             </a:extLst>
           </p:cNvPr>
@@ -23794,75 +23862,13 @@
             <a:spLocks noGrp="1"/>
           </p:cNvSpPr>
           <p:nvPr>
-            <p:ph type="ftr" sz="quarter" idx="3"/>
+            <p:ph type="chart" sz="quarter" idx="24"/>
           </p:nvPr>
         </p:nvSpPr>
         <p:spPr>
           <a:xfrm>
-            <a:off x="457200" y="6023777"/>
-            <a:ext cx="11277600" cy="365125"/>
-          </a:xfrm>
-          <a:prstGeom prst="rect">
-            <a:avLst/>
-          </a:prstGeom>
-        </p:spPr>
-        <p:txBody>
-          <a:bodyPr vert="horz" lIns="0" tIns="0" rIns="0" bIns="0" rtlCol="0" anchor="b"/>
-          <a:lstStyle>
-            <a:lvl1pPr algn="l">
-              <a:spcBef>
-                <a:spcPts val="0"/>
-              </a:spcBef>
-              <a:defRPr sz="800">
-                <a:solidFill>
-                  <a:schemeClr val="tx1"/>
-                </a:solidFill>
-              </a:defRPr>
-            </a:lvl1pPr>
-          </a:lstStyle>
-          <a:p>
-            <a:r>
-              <a:rPr lang="en-US"/>
-              <a:t>Base:</a:t>
-            </a:r>
-            <a:br>
-              <a:rPr lang="en-US"/>
-            </a:br>
-            <a:r>
-              <a:rPr lang="en-US"/>
-              <a:t>Q:</a:t>
-            </a:r>
-            <a:br>
-              <a:rPr lang="en-US"/>
-            </a:br>
-            <a:r>
-              <a:rPr lang="en-US"/>
-              <a:t>Note:</a:t>
-            </a:r>
-            <a:endParaRPr lang="en-US" dirty="0"/>
-          </a:p>
-        </p:txBody>
-      </p:sp>
-      <p:sp>
-        <p:nvSpPr>
-          <p:cNvPr id="10" name="Chart 1">
-            <a:extLst>
-              <a:ext uri="{FF2B5EF4-FFF2-40B4-BE49-F238E27FC236}">
-                <a16:creationId xmlns:a16="http://schemas.microsoft.com/office/drawing/2014/main" id="{9A82E466-BFEA-440A-BCC7-8B4E383D6F12}"/>
-              </a:ext>
-            </a:extLst>
-          </p:cNvPr>
-          <p:cNvSpPr>
-            <a:spLocks noGrp="1"/>
-          </p:cNvSpPr>
-          <p:nvPr>
-            <p:ph type="chart" sz="quarter" idx="15"/>
-          </p:nvPr>
-        </p:nvSpPr>
-        <p:spPr>
-          <a:xfrm>
-            <a:off x="4365460" y="419100"/>
-            <a:ext cx="3456432" cy="2508095"/>
+            <a:off x="4363257" y="436549"/>
+            <a:ext cx="3456432" cy="2624328"/>
           </a:xfrm>
           <a:prstGeom prst="rect">
             <a:avLst/>
@@ -23878,10 +23884,10 @@
       </p:sp>
       <p:sp>
         <p:nvSpPr>
-          <p:cNvPr id="12" name="Chart 1">
+          <p:cNvPr id="15" name="Chart 4">
             <a:extLst>
               <a:ext uri="{FF2B5EF4-FFF2-40B4-BE49-F238E27FC236}">
-                <a16:creationId xmlns:a16="http://schemas.microsoft.com/office/drawing/2014/main" id="{BF75C318-5D1B-4342-AF03-80CF0BF94C20}"/>
+                <a16:creationId xmlns:a16="http://schemas.microsoft.com/office/drawing/2014/main" id="{4564C230-395F-4C21-8193-F363F3D023EF}"/>
               </a:ext>
             </a:extLst>
           </p:cNvPr>
@@ -23889,13 +23895,13 @@
             <a:spLocks noGrp="1"/>
           </p:cNvSpPr>
           <p:nvPr>
-            <p:ph type="chart" sz="quarter" idx="16"/>
+            <p:ph type="chart" sz="quarter" idx="23"/>
           </p:nvPr>
         </p:nvSpPr>
         <p:spPr>
           <a:xfrm>
-            <a:off x="8270807" y="419100"/>
-            <a:ext cx="3456432" cy="2508095"/>
+            <a:off x="8269315" y="436549"/>
+            <a:ext cx="3456432" cy="2624328"/>
           </a:xfrm>
           <a:prstGeom prst="rect">
             <a:avLst/>
@@ -23911,10 +23917,76 @@
       </p:sp>
       <p:sp>
         <p:nvSpPr>
+          <p:cNvPr id="14" name="Chart 3">
+            <a:extLst>
+              <a:ext uri="{FF2B5EF4-FFF2-40B4-BE49-F238E27FC236}">
+                <a16:creationId xmlns:a16="http://schemas.microsoft.com/office/drawing/2014/main" id="{735A41CB-1466-4F07-B8D6-D05A440C05D6}"/>
+              </a:ext>
+            </a:extLst>
+          </p:cNvPr>
+          <p:cNvSpPr>
+            <a:spLocks noGrp="1"/>
+          </p:cNvSpPr>
+          <p:nvPr>
+            <p:ph type="chart" sz="quarter" idx="21"/>
+          </p:nvPr>
+        </p:nvSpPr>
+        <p:spPr>
+          <a:xfrm>
+            <a:off x="457200" y="3241848"/>
+            <a:ext cx="3456432" cy="2627023"/>
+          </a:xfrm>
+          <a:prstGeom prst="rect">
+            <a:avLst/>
+          </a:prstGeom>
+        </p:spPr>
+        <p:txBody>
+          <a:bodyPr/>
+          <a:lstStyle/>
+          <a:p>
+            <a:endParaRPr lang="en-US" dirty="0"/>
+          </a:p>
+        </p:txBody>
+      </p:sp>
+      <p:sp>
+        <p:nvSpPr>
+          <p:cNvPr id="12" name="Chart 2">
+            <a:extLst>
+              <a:ext uri="{FF2B5EF4-FFF2-40B4-BE49-F238E27FC236}">
+                <a16:creationId xmlns:a16="http://schemas.microsoft.com/office/drawing/2014/main" id="{360FEB04-7853-4575-85C5-0B6E6F0C8384}"/>
+              </a:ext>
+            </a:extLst>
+          </p:cNvPr>
+          <p:cNvSpPr>
+            <a:spLocks noGrp="1"/>
+          </p:cNvSpPr>
+          <p:nvPr>
+            <p:ph type="chart" sz="quarter" idx="19"/>
+          </p:nvPr>
+        </p:nvSpPr>
+        <p:spPr>
+          <a:xfrm>
+            <a:off x="4363257" y="3241848"/>
+            <a:ext cx="3456432" cy="2627023"/>
+          </a:xfrm>
+          <a:prstGeom prst="rect">
+            <a:avLst/>
+          </a:prstGeom>
+        </p:spPr>
+        <p:txBody>
+          <a:bodyPr/>
+          <a:lstStyle/>
+          <a:p>
+            <a:endParaRPr lang="en-US" dirty="0"/>
+          </a:p>
+        </p:txBody>
+      </p:sp>
+      <p:sp>
+        <p:nvSpPr>
           <p:cNvPr id="9" name="Chart 1">
             <a:extLst>
               <a:ext uri="{FF2B5EF4-FFF2-40B4-BE49-F238E27FC236}">
-                <a16:creationId xmlns:a16="http://schemas.microsoft.com/office/drawing/2014/main" id="{B99A07DE-0626-4920-AB7F-443A7F8C8486}"/>
+                <a16:creationId xmlns:a16="http://schemas.microsoft.com/office/drawing/2014/main" id="{F4A6D268-AFCF-4422-BA46-0325498708B6}"/>
               </a:ext>
             </a:extLst>
           </p:cNvPr>
@@ -23927,8 +23999,8 @@
         </p:nvSpPr>
         <p:spPr>
           <a:xfrm>
-            <a:off x="468990" y="3173614"/>
-            <a:ext cx="3456432" cy="2508095"/>
+            <a:off x="8269315" y="3241848"/>
+            <a:ext cx="3456432" cy="2627023"/>
           </a:xfrm>
           <a:prstGeom prst="rect">
             <a:avLst/>
@@ -23942,79 +24014,13 @@
           </a:p>
         </p:txBody>
       </p:sp>
-      <p:sp>
-        <p:nvSpPr>
-          <p:cNvPr id="11" name="Chart 1">
-            <a:extLst>
-              <a:ext uri="{FF2B5EF4-FFF2-40B4-BE49-F238E27FC236}">
-                <a16:creationId xmlns:a16="http://schemas.microsoft.com/office/drawing/2014/main" id="{D16F2150-A665-4E17-ADCC-9C197F12C714}"/>
-              </a:ext>
-            </a:extLst>
-          </p:cNvPr>
-          <p:cNvSpPr>
-            <a:spLocks noGrp="1"/>
-          </p:cNvSpPr>
-          <p:nvPr>
-            <p:ph type="chart" sz="quarter" idx="18"/>
-          </p:nvPr>
-        </p:nvSpPr>
-        <p:spPr>
-          <a:xfrm>
-            <a:off x="4365460" y="3173614"/>
-            <a:ext cx="3456432" cy="2508095"/>
-          </a:xfrm>
-          <a:prstGeom prst="rect">
-            <a:avLst/>
-          </a:prstGeom>
-        </p:spPr>
-        <p:txBody>
-          <a:bodyPr/>
-          <a:lstStyle/>
-          <a:p>
-            <a:endParaRPr lang="en-US" dirty="0"/>
-          </a:p>
-        </p:txBody>
-      </p:sp>
-      <p:sp>
-        <p:nvSpPr>
-          <p:cNvPr id="13" name="Chart 1">
-            <a:extLst>
-              <a:ext uri="{FF2B5EF4-FFF2-40B4-BE49-F238E27FC236}">
-                <a16:creationId xmlns:a16="http://schemas.microsoft.com/office/drawing/2014/main" id="{C2B38A4F-BFC0-4AE5-967F-24A358BBE92A}"/>
-              </a:ext>
-            </a:extLst>
-          </p:cNvPr>
-          <p:cNvSpPr>
-            <a:spLocks noGrp="1"/>
-          </p:cNvSpPr>
-          <p:nvPr>
-            <p:ph type="chart" sz="quarter" idx="19"/>
-          </p:nvPr>
-        </p:nvSpPr>
-        <p:spPr>
-          <a:xfrm>
-            <a:off x="8270807" y="3173614"/>
-            <a:ext cx="3456432" cy="2508095"/>
-          </a:xfrm>
-          <a:prstGeom prst="rect">
-            <a:avLst/>
-          </a:prstGeom>
-        </p:spPr>
-        <p:txBody>
-          <a:bodyPr/>
-          <a:lstStyle/>
-          <a:p>
-            <a:endParaRPr lang="en-US" dirty="0"/>
-          </a:p>
-        </p:txBody>
-      </p:sp>
     </p:spTree>
     <p:custDataLst>
       <p:tags r:id="rId1"/>
     </p:custDataLst>
     <p:extLst>
       <p:ext uri="{BB962C8B-B14F-4D97-AF65-F5344CB8AC3E}">
-        <p14:creationId xmlns:p14="http://schemas.microsoft.com/office/powerpoint/2010/main" val="4000894183"/>
+        <p14:creationId xmlns:p14="http://schemas.microsoft.com/office/powerpoint/2010/main" val="1210371339"/>
       </p:ext>
     </p:extLst>
   </p:cSld>
@@ -37221,7 +37227,7 @@
     <p:sldLayoutId id="2147483713" r:id="rId38"/>
     <p:sldLayoutId id="2147483724" r:id="rId39"/>
     <p:sldLayoutId id="2147483705" r:id="rId40"/>
-    <p:sldLayoutId id="2147483764" r:id="rId41"/>
+    <p:sldLayoutId id="2147483765" r:id="rId41"/>
     <p:sldLayoutId id="2147483702" r:id="rId42"/>
     <p:sldLayoutId id="2147483721" r:id="rId43"/>
     <p:sldLayoutId id="2147483747" r:id="rId44"/>

</xml_diff>